<commit_message>
response to review: rephrase secion about inpainting at encoder and modified figure about group based encoding
</commit_message>
<xml_diff>
--- a/doc/test_model/images/4_encoder/group_based_encoder.pptx
+++ b/doc/test_model/images/4_encoder/group_based_encoder.pptx
@@ -207,7 +207,7 @@
           <a:p>
             <a:fld id="{F158D50A-45A0-48F6-8AD9-0F53C3AA89D7}" type="datetimeFigureOut">
               <a:rPr lang="en-US" smtClean="0"/>
-              <a:t>2021-01-22</a:t>
+              <a:t>1/27/2021</a:t>
             </a:fld>
             <a:endParaRPr lang="en-US"/>
           </a:p>
@@ -690,7 +690,7 @@
           <a:p>
             <a:fld id="{740F5C02-262D-4A5D-8B31-B89C1E5007F6}" type="datetimeFigureOut">
               <a:rPr lang="en-US" smtClean="0"/>
-              <a:t>2021-01-22</a:t>
+              <a:t>1/27/2021</a:t>
             </a:fld>
             <a:endParaRPr lang="en-US"/>
           </a:p>
@@ -858,7 +858,7 @@
           <a:p>
             <a:fld id="{740F5C02-262D-4A5D-8B31-B89C1E5007F6}" type="datetimeFigureOut">
               <a:rPr lang="en-US" smtClean="0"/>
-              <a:t>2021-01-22</a:t>
+              <a:t>1/27/2021</a:t>
             </a:fld>
             <a:endParaRPr lang="en-US"/>
           </a:p>
@@ -1036,7 +1036,7 @@
           <a:p>
             <a:fld id="{740F5C02-262D-4A5D-8B31-B89C1E5007F6}" type="datetimeFigureOut">
               <a:rPr lang="en-US" smtClean="0"/>
-              <a:t>2021-01-22</a:t>
+              <a:t>1/27/2021</a:t>
             </a:fld>
             <a:endParaRPr lang="en-US"/>
           </a:p>
@@ -1204,7 +1204,7 @@
           <a:p>
             <a:fld id="{740F5C02-262D-4A5D-8B31-B89C1E5007F6}" type="datetimeFigureOut">
               <a:rPr lang="en-US" smtClean="0"/>
-              <a:t>2021-01-22</a:t>
+              <a:t>1/27/2021</a:t>
             </a:fld>
             <a:endParaRPr lang="en-US"/>
           </a:p>
@@ -1449,7 +1449,7 @@
           <a:p>
             <a:fld id="{740F5C02-262D-4A5D-8B31-B89C1E5007F6}" type="datetimeFigureOut">
               <a:rPr lang="en-US" smtClean="0"/>
-              <a:t>2021-01-22</a:t>
+              <a:t>1/27/2021</a:t>
             </a:fld>
             <a:endParaRPr lang="en-US"/>
           </a:p>
@@ -1678,7 +1678,7 @@
           <a:p>
             <a:fld id="{740F5C02-262D-4A5D-8B31-B89C1E5007F6}" type="datetimeFigureOut">
               <a:rPr lang="en-US" smtClean="0"/>
-              <a:t>2021-01-22</a:t>
+              <a:t>1/27/2021</a:t>
             </a:fld>
             <a:endParaRPr lang="en-US"/>
           </a:p>
@@ -2042,7 +2042,7 @@
           <a:p>
             <a:fld id="{740F5C02-262D-4A5D-8B31-B89C1E5007F6}" type="datetimeFigureOut">
               <a:rPr lang="en-US" smtClean="0"/>
-              <a:t>2021-01-22</a:t>
+              <a:t>1/27/2021</a:t>
             </a:fld>
             <a:endParaRPr lang="en-US"/>
           </a:p>
@@ -2159,7 +2159,7 @@
           <a:p>
             <a:fld id="{740F5C02-262D-4A5D-8B31-B89C1E5007F6}" type="datetimeFigureOut">
               <a:rPr lang="en-US" smtClean="0"/>
-              <a:t>2021-01-22</a:t>
+              <a:t>1/27/2021</a:t>
             </a:fld>
             <a:endParaRPr lang="en-US"/>
           </a:p>
@@ -2254,7 +2254,7 @@
           <a:p>
             <a:fld id="{740F5C02-262D-4A5D-8B31-B89C1E5007F6}" type="datetimeFigureOut">
               <a:rPr lang="en-US" smtClean="0"/>
-              <a:t>2021-01-22</a:t>
+              <a:t>1/27/2021</a:t>
             </a:fld>
             <a:endParaRPr lang="en-US"/>
           </a:p>
@@ -2529,7 +2529,7 @@
           <a:p>
             <a:fld id="{740F5C02-262D-4A5D-8B31-B89C1E5007F6}" type="datetimeFigureOut">
               <a:rPr lang="en-US" smtClean="0"/>
-              <a:t>2021-01-22</a:t>
+              <a:t>1/27/2021</a:t>
             </a:fld>
             <a:endParaRPr lang="en-US"/>
           </a:p>
@@ -2781,7 +2781,7 @@
           <a:p>
             <a:fld id="{740F5C02-262D-4A5D-8B31-B89C1E5007F6}" type="datetimeFigureOut">
               <a:rPr lang="en-US" smtClean="0"/>
-              <a:t>2021-01-22</a:t>
+              <a:t>1/27/2021</a:t>
             </a:fld>
             <a:endParaRPr lang="en-US"/>
           </a:p>
@@ -2992,7 +2992,7 @@
           <a:p>
             <a:fld id="{740F5C02-262D-4A5D-8B31-B89C1E5007F6}" type="datetimeFigureOut">
               <a:rPr lang="en-US" smtClean="0"/>
-              <a:t>2021-01-22</a:t>
+              <a:t>1/27/2021</a:t>
             </a:fld>
             <a:endParaRPr lang="en-US"/>
           </a:p>
@@ -3732,7 +3732,7 @@
         </p:nvSpPr>
         <p:spPr>
           <a:xfrm>
-            <a:off x="5377286" y="628016"/>
+            <a:off x="5237327" y="628016"/>
             <a:ext cx="1251104" cy="980639"/>
           </a:xfrm>
           <a:prstGeom prst="roundRect">
@@ -3765,7 +3765,7 @@
           <a:p>
             <a:pPr algn="ctr"/>
             <a:r>
-              <a:rPr lang="en-US">
+              <a:rPr lang="en-US" dirty="0">
                 <a:latin typeface="Arial" panose="020B0604020202020204" pitchFamily="34" charset="0"/>
                 <a:cs typeface="Arial" panose="020B0604020202020204" pitchFamily="34" charset="0"/>
               </a:rPr>
@@ -4245,7 +4245,7 @@
         </p:nvSpPr>
         <p:spPr>
           <a:xfrm>
-            <a:off x="7054138" y="625083"/>
+            <a:off x="8457488" y="625083"/>
             <a:ext cx="1251104" cy="980639"/>
           </a:xfrm>
           <a:prstGeom prst="roundRect">
@@ -4420,13 +4420,13 @@
         </p:nvCxnSpPr>
         <p:spPr>
           <a:xfrm rot="5400000">
-            <a:off x="4715008" y="567376"/>
-            <a:ext cx="1926337" cy="4003029"/>
+            <a:off x="5416683" y="-134299"/>
+            <a:ext cx="1926337" cy="5406379"/>
           </a:xfrm>
           <a:prstGeom prst="bentConnector4">
             <a:avLst>
               <a:gd name="adj1" fmla="val 8500"/>
-              <a:gd name="adj2" fmla="val 105711"/>
+              <a:gd name="adj2" fmla="val 104228"/>
             </a:avLst>
           </a:prstGeom>
           <a:ln>
@@ -5356,14 +5356,14 @@
           <a:p>
             <a:pPr algn="ctr"/>
             <a:r>
-              <a:rPr lang="en-US" sz="1600">
+              <a:rPr lang="en-US" sz="1600" dirty="0">
                 <a:latin typeface="Arial" panose="020B0604020202020204" pitchFamily="34" charset="0"/>
                 <a:cs typeface="Arial" panose="020B0604020202020204" pitchFamily="34" charset="0"/>
               </a:rPr>
               <a:t>Geometry quality </a:t>
             </a:r>
             <a:r>
-              <a:rPr lang="en-US" sz="1600" spc="-90">
+              <a:rPr lang="en-US" sz="1600" spc="-90" dirty="0">
                 <a:latin typeface="Arial" panose="020B0604020202020204" pitchFamily="34" charset="0"/>
                 <a:cs typeface="Arial" panose="020B0604020202020204" pitchFamily="34" charset="0"/>
               </a:rPr>
@@ -5384,7 +5384,7 @@
         <p:spPr>
           <a:xfrm>
             <a:off x="4927765" y="1112385"/>
-            <a:ext cx="449521" cy="5951"/>
+            <a:ext cx="309562" cy="5951"/>
           </a:xfrm>
           <a:prstGeom prst="straightConnector1">
             <a:avLst/>
@@ -5412,15 +5412,16 @@
         <p:nvCxnSpPr>
           <p:cNvPr id="264" name="Straight Arrow Connector 263"/>
           <p:cNvCxnSpPr>
+            <a:cxnSpLocks/>
             <a:stCxn id="4" idx="3"/>
-            <a:endCxn id="144" idx="1"/>
+            <a:endCxn id="81" idx="1"/>
           </p:cNvCxnSpPr>
           <p:nvPr/>
         </p:nvCxnSpPr>
         <p:spPr>
           <a:xfrm flipV="1">
-            <a:off x="6628390" y="1115403"/>
-            <a:ext cx="425748" cy="2933"/>
+            <a:off x="6488431" y="1115403"/>
+            <a:ext cx="294926" cy="2933"/>
           </a:xfrm>
           <a:prstGeom prst="straightConnector1">
             <a:avLst/>
@@ -6760,6 +6761,133 @@
           </a:p>
         </p:txBody>
       </p:sp>
+      <p:sp>
+        <p:nvSpPr>
+          <p:cNvPr id="81" name="Rounded Rectangle 3">
+            <a:extLst>
+              <a:ext uri="{FF2B5EF4-FFF2-40B4-BE49-F238E27FC236}">
+                <a16:creationId xmlns:a16="http://schemas.microsoft.com/office/drawing/2014/main" id="{11AEE487-817F-4C4A-BAEA-DACE8C28A8CD}"/>
+              </a:ext>
+            </a:extLst>
+          </p:cNvPr>
+          <p:cNvSpPr/>
+          <p:nvPr/>
+        </p:nvSpPr>
+        <p:spPr>
+          <a:xfrm>
+            <a:off x="6783357" y="625083"/>
+            <a:ext cx="1359704" cy="980639"/>
+          </a:xfrm>
+          <a:prstGeom prst="roundRect">
+            <a:avLst/>
+          </a:prstGeom>
+          <a:solidFill>
+            <a:schemeClr val="accent1">
+              <a:lumMod val="40000"/>
+              <a:lumOff val="60000"/>
+            </a:schemeClr>
+          </a:solidFill>
+        </p:spPr>
+        <p:style>
+          <a:lnRef idx="2">
+            <a:schemeClr val="dk1"/>
+          </a:lnRef>
+          <a:fillRef idx="1">
+            <a:schemeClr val="lt1"/>
+          </a:fillRef>
+          <a:effectRef idx="0">
+            <a:schemeClr val="dk1"/>
+          </a:effectRef>
+          <a:fontRef idx="minor">
+            <a:schemeClr val="dk1"/>
+          </a:fontRef>
+        </p:style>
+        <p:txBody>
+          <a:bodyPr rtlCol="0" anchor="ctr"/>
+          <a:lstStyle/>
+          <a:p>
+            <a:pPr algn="ctr"/>
+            <a:endParaRPr lang="en-GB" sz="1600" dirty="0"/>
+          </a:p>
+          <a:p>
+            <a:pPr algn="ctr"/>
+            <a:r>
+              <a:rPr lang="en-GB" sz="1600" dirty="0">
+                <a:latin typeface="Arial" panose="020B0604020202020204" pitchFamily="34" charset="0"/>
+                <a:cs typeface="Arial" panose="020B0604020202020204" pitchFamily="34" charset="0"/>
+              </a:rPr>
+              <a:t>Synthesize </a:t>
+            </a:r>
+            <a:r>
+              <a:rPr lang="en-GB" sz="1600" dirty="0" err="1">
+                <a:latin typeface="Arial" panose="020B0604020202020204" pitchFamily="34" charset="0"/>
+                <a:cs typeface="Arial" panose="020B0604020202020204" pitchFamily="34" charset="0"/>
+              </a:rPr>
+              <a:t>inpainted</a:t>
+            </a:r>
+            <a:r>
+              <a:rPr lang="en-GB" sz="1600" dirty="0">
+                <a:latin typeface="Arial" panose="020B0604020202020204" pitchFamily="34" charset="0"/>
+                <a:cs typeface="Arial" panose="020B0604020202020204" pitchFamily="34" charset="0"/>
+              </a:rPr>
+              <a:t> background</a:t>
+            </a:r>
+            <a:br>
+              <a:rPr lang="en-US" dirty="0">
+                <a:latin typeface="Arial" panose="020B0604020202020204" pitchFamily="34" charset="0"/>
+                <a:cs typeface="Arial" panose="020B0604020202020204" pitchFamily="34" charset="0"/>
+              </a:rPr>
+            </a:br>
+            <a:endParaRPr lang="en-US" dirty="0">
+              <a:latin typeface="Arial" panose="020B0604020202020204" pitchFamily="34" charset="0"/>
+              <a:cs typeface="Arial" panose="020B0604020202020204" pitchFamily="34" charset="0"/>
+            </a:endParaRPr>
+          </a:p>
+        </p:txBody>
+      </p:sp>
+      <p:cxnSp>
+        <p:nvCxnSpPr>
+          <p:cNvPr id="83" name="Straight Arrow Connector 82">
+            <a:extLst>
+              <a:ext uri="{FF2B5EF4-FFF2-40B4-BE49-F238E27FC236}">
+                <a16:creationId xmlns:a16="http://schemas.microsoft.com/office/drawing/2014/main" id="{1CE9FEE7-0648-4993-97D0-EBF9083ED275}"/>
+              </a:ext>
+            </a:extLst>
+          </p:cNvPr>
+          <p:cNvCxnSpPr>
+            <a:cxnSpLocks/>
+            <a:stCxn id="81" idx="3"/>
+            <a:endCxn id="144" idx="1"/>
+          </p:cNvCxnSpPr>
+          <p:nvPr/>
+        </p:nvCxnSpPr>
+        <p:spPr>
+          <a:xfrm>
+            <a:off x="8143061" y="1115403"/>
+            <a:ext cx="314427" cy="0"/>
+          </a:xfrm>
+          <a:prstGeom prst="straightConnector1">
+            <a:avLst/>
+          </a:prstGeom>
+          <a:ln>
+            <a:tailEnd type="triangle"/>
+          </a:ln>
+        </p:spPr>
+        <p:style>
+          <a:lnRef idx="3">
+            <a:schemeClr val="dk1"/>
+          </a:lnRef>
+          <a:fillRef idx="0">
+            <a:schemeClr val="dk1"/>
+          </a:fillRef>
+          <a:effectRef idx="2">
+            <a:schemeClr val="dk1"/>
+          </a:effectRef>
+          <a:fontRef idx="minor">
+            <a:schemeClr val="tx1"/>
+          </a:fontRef>
+        </p:style>
+      </p:cxnSp>
     </p:spTree>
     <p:extLst>
       <p:ext uri="{BB962C8B-B14F-4D97-AF65-F5344CB8AC3E}">
@@ -7296,6 +7424,21 @@
 </file>
 
 <file path=customXml/item1.xml><?xml version="1.0" encoding="utf-8"?>
+<?mso-contentType ?>
+<FormTemplates xmlns="http://schemas.microsoft.com/sharepoint/v3/contenttype/forms">
+  <Display>DocumentLibraryForm</Display>
+  <Edit>DocumentLibraryForm</Edit>
+  <New>DocumentLibraryForm</New>
+</FormTemplates>
+</file>
+
+<file path=customXml/item2.xml><?xml version="1.0" encoding="utf-8"?>
+<p:properties xmlns:p="http://schemas.microsoft.com/office/2006/metadata/properties" xmlns:xsi="http://www.w3.org/2001/XMLSchema-instance" xmlns:pc="http://schemas.microsoft.com/office/infopath/2007/PartnerControls">
+  <documentManagement/>
+</p:properties>
+</file>
+
+<file path=customXml/item3.xml><?xml version="1.0" encoding="utf-8"?>
 <ct:contentTypeSchema xmlns:ct="http://schemas.microsoft.com/office/2006/metadata/contentType" xmlns:ma="http://schemas.microsoft.com/office/2006/metadata/properties/metaAttributes" ct:_="" ma:_="" ma:contentTypeName="Document" ma:contentTypeID="0x0101009EC9F0DD9400F54D954C9A7C2427A94A" ma:contentTypeVersion="13" ma:contentTypeDescription="Create a new document." ma:contentTypeScope="" ma:versionID="eb935924ef2a159d0563b60c48e4104f">
   <xsd:schema xmlns:xsd="http://www.w3.org/2001/XMLSchema" xmlns:xs="http://www.w3.org/2001/XMLSchema" xmlns:p="http://schemas.microsoft.com/office/2006/metadata/properties" xmlns:ns3="b4ad8c07-7b94-407c-a4af-bce09d822d03" xmlns:ns4="3b932f13-25ad-4a41-b9e0-2b7e71729ec4" targetNamespace="http://schemas.microsoft.com/office/2006/metadata/properties" ma:root="true" ma:fieldsID="609775bff946e424a5aa94c51996d779" ns3:_="" ns4:_="">
     <xsd:import namespace="b4ad8c07-7b94-407c-a4af-bce09d822d03"/>
@@ -7518,36 +7661,10 @@
 </ct:contentTypeSchema>
 </file>
 
-<file path=customXml/item2.xml><?xml version="1.0" encoding="utf-8"?>
-<p:properties xmlns:p="http://schemas.microsoft.com/office/2006/metadata/properties" xmlns:xsi="http://www.w3.org/2001/XMLSchema-instance" xmlns:pc="http://schemas.microsoft.com/office/infopath/2007/PartnerControls">
-  <documentManagement/>
-</p:properties>
-</file>
-
-<file path=customXml/item3.xml><?xml version="1.0" encoding="utf-8"?>
-<?mso-contentType ?>
-<FormTemplates xmlns="http://schemas.microsoft.com/sharepoint/v3/contenttype/forms">
-  <Display>DocumentLibraryForm</Display>
-  <Edit>DocumentLibraryForm</Edit>
-  <New>DocumentLibraryForm</New>
-</FormTemplates>
-</file>
-
 <file path=customXml/itemProps1.xml><?xml version="1.0" encoding="utf-8"?>
-<ds:datastoreItem xmlns:ds="http://schemas.openxmlformats.org/officeDocument/2006/customXml" ds:itemID="{968DC993-C98D-42F1-A3EF-2EC62BF70C7D}">
+<ds:datastoreItem xmlns:ds="http://schemas.openxmlformats.org/officeDocument/2006/customXml" ds:itemID="{75990CAF-072B-4971-AC0A-4991C9FCB620}">
   <ds:schemaRefs>
-    <ds:schemaRef ds:uri="3b932f13-25ad-4a41-b9e0-2b7e71729ec4"/>
-    <ds:schemaRef ds:uri="b4ad8c07-7b94-407c-a4af-bce09d822d03"/>
-    <ds:schemaRef ds:uri="http://purl.org/dc/elements/1.1/"/>
-    <ds:schemaRef ds:uri="http://purl.org/dc/terms/"/>
-    <ds:schemaRef ds:uri="http://schemas.microsoft.com/internal/obd"/>
-    <ds:schemaRef ds:uri="http://schemas.microsoft.com/office/2006/documentManagement/types"/>
-    <ds:schemaRef ds:uri="http://schemas.microsoft.com/office/2006/metadata/contentType"/>
-    <ds:schemaRef ds:uri="http://schemas.microsoft.com/office/2006/metadata/properties"/>
-    <ds:schemaRef ds:uri="http://schemas.microsoft.com/office/2006/metadata/properties/metaAttributes"/>
-    <ds:schemaRef ds:uri="http://schemas.microsoft.com/office/infopath/2007/PartnerControls"/>
-    <ds:schemaRef ds:uri="http://schemas.openxmlformats.org/package/2006/metadata/core-properties"/>
-    <ds:schemaRef ds:uri="http://www.w3.org/2001/XMLSchema"/>
+    <ds:schemaRef ds:uri="http://schemas.microsoft.com/sharepoint/v3/contenttype/forms"/>
   </ds:schemaRefs>
 </ds:datastoreItem>
 </file>
@@ -7570,9 +7687,20 @@
 </file>
 
 <file path=customXml/itemProps3.xml><?xml version="1.0" encoding="utf-8"?>
-<ds:datastoreItem xmlns:ds="http://schemas.openxmlformats.org/officeDocument/2006/customXml" ds:itemID="{75990CAF-072B-4971-AC0A-4991C9FCB620}">
+<ds:datastoreItem xmlns:ds="http://schemas.openxmlformats.org/officeDocument/2006/customXml" ds:itemID="{968DC993-C98D-42F1-A3EF-2EC62BF70C7D}">
   <ds:schemaRefs>
-    <ds:schemaRef ds:uri="http://schemas.microsoft.com/sharepoint/v3/contenttype/forms"/>
+    <ds:schemaRef ds:uri="3b932f13-25ad-4a41-b9e0-2b7e71729ec4"/>
+    <ds:schemaRef ds:uri="b4ad8c07-7b94-407c-a4af-bce09d822d03"/>
+    <ds:schemaRef ds:uri="http://purl.org/dc/elements/1.1/"/>
+    <ds:schemaRef ds:uri="http://purl.org/dc/terms/"/>
+    <ds:schemaRef ds:uri="http://schemas.microsoft.com/internal/obd"/>
+    <ds:schemaRef ds:uri="http://schemas.microsoft.com/office/2006/documentManagement/types"/>
+    <ds:schemaRef ds:uri="http://schemas.microsoft.com/office/2006/metadata/contentType"/>
+    <ds:schemaRef ds:uri="http://schemas.microsoft.com/office/2006/metadata/properties"/>
+    <ds:schemaRef ds:uri="http://schemas.microsoft.com/office/2006/metadata/properties/metaAttributes"/>
+    <ds:schemaRef ds:uri="http://schemas.microsoft.com/office/infopath/2007/PartnerControls"/>
+    <ds:schemaRef ds:uri="http://schemas.openxmlformats.org/package/2006/metadata/core-properties"/>
+    <ds:schemaRef ds:uri="http://www.w3.org/2001/XMLSchema"/>
   </ds:schemaRefs>
 </ds:datastoreItem>
 </file>
</xml_diff>